<commit_message>
Cleanup conda redundancies Add link for github issues
</commit_message>
<xml_diff>
--- a/img/drawings.pptx
+++ b/img/drawings.pptx
@@ -6,6 +6,7 @@
   </p:sldMasterIdLst>
   <p:sldIdLst>
     <p:sldId id="256" r:id="rId2"/>
+    <p:sldId id="257" r:id="rId3"/>
   </p:sldIdLst>
   <p:sldSz cx="12192000" cy="6858000"/>
   <p:notesSz cx="6858000" cy="9144000"/>
@@ -3356,10 +3357,10 @@
         </p:nvGrpSpPr>
         <p:grpSpPr>
           <a:xfrm>
-            <a:off x="279850" y="1602231"/>
-            <a:ext cx="9305285" cy="3531152"/>
-            <a:chOff x="279850" y="1602231"/>
-            <a:chExt cx="9305285" cy="3531152"/>
+            <a:off x="309479" y="1602231"/>
+            <a:ext cx="9284458" cy="3064964"/>
+            <a:chOff x="309479" y="1602231"/>
+            <a:chExt cx="9284458" cy="3064964"/>
           </a:xfrm>
         </p:grpSpPr>
         <p:pic>
@@ -4157,8 +4158,8 @@
           </p:nvSpPr>
           <p:spPr>
             <a:xfrm>
-              <a:off x="279850" y="3933054"/>
-              <a:ext cx="9284458" cy="1200329"/>
+              <a:off x="309479" y="3713088"/>
+              <a:ext cx="9284458" cy="954107"/>
             </a:xfrm>
             <a:prstGeom prst="rect">
               <a:avLst/>
@@ -4172,7 +4173,7 @@
             <a:lstStyle/>
             <a:p>
               <a:r>
-                <a:rPr lang="en-GB" dirty="0"/>
+                <a:rPr lang="en-GB" sz="1400" dirty="0"/>
                 <a:t>Resources:</a:t>
               </a:r>
             </a:p>
@@ -4182,7 +4183,7 @@
                 <a:buChar char="•"/>
               </a:pPr>
               <a:r>
-                <a:rPr lang="en-GB" dirty="0"/>
+                <a:rPr lang="en-GB" sz="1400" dirty="0"/>
                 <a:t>Memory on head node and compute nodes: 512 GB</a:t>
               </a:r>
             </a:p>
@@ -4192,12 +4193,12 @@
                 <a:buChar char="•"/>
               </a:pPr>
               <a:r>
-                <a:rPr lang="en-GB" dirty="0"/>
+                <a:rPr lang="en-GB" sz="1400" dirty="0"/>
                 <a:t>Storage: all users have a fast 25 GB SSD home directory and a 500 GB home directory</a:t>
               </a:r>
             </a:p>
             <a:p>
-              <a:endParaRPr lang="en-NL" dirty="0"/>
+              <a:endParaRPr lang="en-NL" sz="1400" dirty="0"/>
             </a:p>
           </p:txBody>
         </p:sp>
@@ -4294,6 +4295,121 @@
     <p:extLst>
       <p:ext uri="{BB962C8B-B14F-4D97-AF65-F5344CB8AC3E}">
         <p14:creationId xmlns:p14="http://schemas.microsoft.com/office/powerpoint/2010/main" val="458675315"/>
+      </p:ext>
+    </p:extLst>
+  </p:cSld>
+  <p:clrMapOvr>
+    <a:masterClrMapping/>
+  </p:clrMapOvr>
+</p:sld>
+</file>
+
+<file path=ppt/slides/slide2.xml><?xml version="1.0" encoding="utf-8"?>
+<p:sld xmlns:a="http://schemas.openxmlformats.org/drawingml/2006/main" xmlns:r="http://schemas.openxmlformats.org/officeDocument/2006/relationships" xmlns:p="http://schemas.openxmlformats.org/presentationml/2006/main">
+  <p:cSld>
+    <p:spTree>
+      <p:nvGrpSpPr>
+        <p:cNvPr id="1" name=""/>
+        <p:cNvGrpSpPr/>
+        <p:nvPr/>
+      </p:nvGrpSpPr>
+      <p:grpSpPr>
+        <a:xfrm>
+          <a:off x="0" y="0"/>
+          <a:ext cx="0" cy="0"/>
+          <a:chOff x="0" y="0"/>
+          <a:chExt cx="0" cy="0"/>
+        </a:xfrm>
+      </p:grpSpPr>
+      <p:pic>
+        <p:nvPicPr>
+          <p:cNvPr id="3" name="Picture 2" descr="A blue wavy surface with dots&#10;&#10;Description automatically generated">
+            <a:extLst>
+              <a:ext uri="{FF2B5EF4-FFF2-40B4-BE49-F238E27FC236}">
+                <a16:creationId xmlns:a16="http://schemas.microsoft.com/office/drawing/2014/main" id="{82FDB4DF-9580-E06F-9E23-FA187B85FD16}"/>
+              </a:ext>
+            </a:extLst>
+          </p:cNvPr>
+          <p:cNvPicPr>
+            <a:picLocks noChangeAspect="1"/>
+          </p:cNvPicPr>
+          <p:nvPr/>
+        </p:nvPicPr>
+        <p:blipFill>
+          <a:blip r:embed="rId2">
+            <a:extLst>
+              <a:ext uri="{28A0092B-C50C-407E-A947-70E740481C1C}">
+                <a14:useLocalDpi xmlns:a14="http://schemas.microsoft.com/office/drawing/2010/main" val="0"/>
+              </a:ext>
+            </a:extLst>
+          </a:blip>
+          <a:stretch>
+            <a:fillRect/>
+          </a:stretch>
+        </p:blipFill>
+        <p:spPr>
+          <a:xfrm>
+            <a:off x="465423" y="1778310"/>
+            <a:ext cx="11163429" cy="3301380"/>
+          </a:xfrm>
+          <a:prstGeom prst="rect">
+            <a:avLst/>
+          </a:prstGeom>
+        </p:spPr>
+      </p:pic>
+      <p:sp>
+        <p:nvSpPr>
+          <p:cNvPr id="4" name="TextBox 3">
+            <a:extLst>
+              <a:ext uri="{FF2B5EF4-FFF2-40B4-BE49-F238E27FC236}">
+                <a16:creationId xmlns:a16="http://schemas.microsoft.com/office/drawing/2014/main" id="{73A89273-CEE0-A4C3-745F-B0D3ABD68EC0}"/>
+              </a:ext>
+            </a:extLst>
+          </p:cNvPr>
+          <p:cNvSpPr txBox="1"/>
+          <p:nvPr/>
+        </p:nvSpPr>
+        <p:spPr>
+          <a:xfrm>
+            <a:off x="465422" y="3313055"/>
+            <a:ext cx="11163429" cy="861774"/>
+          </a:xfrm>
+          <a:prstGeom prst="rect">
+            <a:avLst/>
+          </a:prstGeom>
+          <a:noFill/>
+        </p:spPr>
+        <p:txBody>
+          <a:bodyPr wrap="square">
+            <a:spAutoFit/>
+          </a:bodyPr>
+          <a:lstStyle/>
+          <a:p>
+            <a:pPr algn="ctr"/>
+            <a:r>
+              <a:rPr lang="en-GB" sz="5000" dirty="0">
+                <a:solidFill>
+                  <a:schemeClr val="bg1"/>
+                </a:solidFill>
+                <a:latin typeface="Aharoni" panose="02010803020104030203" pitchFamily="2" charset="-79"/>
+                <a:cs typeface="Aharoni" panose="02010803020104030203" pitchFamily="2" charset="-79"/>
+              </a:rPr>
+              <a:t>IBED bioinformatics guidance page</a:t>
+            </a:r>
+            <a:endParaRPr lang="en-NL" sz="5000" dirty="0">
+              <a:solidFill>
+                <a:schemeClr val="bg1"/>
+              </a:solidFill>
+              <a:latin typeface="Aharoni" panose="02010803020104030203" pitchFamily="2" charset="-79"/>
+              <a:cs typeface="Aharoni" panose="02010803020104030203" pitchFamily="2" charset="-79"/>
+            </a:endParaRPr>
+          </a:p>
+        </p:txBody>
+      </p:sp>
+    </p:spTree>
+    <p:extLst>
+      <p:ext uri="{BB962C8B-B14F-4D97-AF65-F5344CB8AC3E}">
+        <p14:creationId xmlns:p14="http://schemas.microsoft.com/office/powerpoint/2010/main" val="3287705445"/>
       </p:ext>
     </p:extLst>
   </p:cSld>

</xml_diff>

<commit_message>
add page on otu table analysis
</commit_message>
<xml_diff>
--- a/img/drawings.pptx
+++ b/img/drawings.pptx
@@ -7,6 +7,7 @@
   <p:sldIdLst>
     <p:sldId id="256" r:id="rId2"/>
     <p:sldId id="257" r:id="rId3"/>
+    <p:sldId id="258" r:id="rId4"/>
   </p:sldIdLst>
   <p:sldSz cx="12192000" cy="6858000"/>
   <p:notesSz cx="6858000" cy="9144000"/>
@@ -3345,10 +3346,10 @@
       </p:grpSpPr>
       <p:grpSp>
         <p:nvGrpSpPr>
-          <p:cNvPr id="34" name="Group 33">
-            <a:extLst>
-              <a:ext uri="{FF2B5EF4-FFF2-40B4-BE49-F238E27FC236}">
-                <a16:creationId xmlns:a16="http://schemas.microsoft.com/office/drawing/2014/main" id="{2B8DAB36-1237-199B-C035-36D8E68DD79A}"/>
+          <p:cNvPr id="36" name="Group 35">
+            <a:extLst>
+              <a:ext uri="{FF2B5EF4-FFF2-40B4-BE49-F238E27FC236}">
+                <a16:creationId xmlns:a16="http://schemas.microsoft.com/office/drawing/2014/main" id="{AB301849-A636-DE55-E552-84B36FF92CC8}"/>
               </a:ext>
             </a:extLst>
           </p:cNvPr>
@@ -3357,355 +3358,18 @@
         </p:nvGrpSpPr>
         <p:grpSpPr>
           <a:xfrm>
-            <a:off x="309479" y="1602231"/>
-            <a:ext cx="9284458" cy="3064964"/>
-            <a:chOff x="309479" y="1602231"/>
-            <a:chExt cx="9284458" cy="3064964"/>
+            <a:off x="309479" y="1511559"/>
+            <a:ext cx="9284458" cy="3155636"/>
+            <a:chOff x="309479" y="1511559"/>
+            <a:chExt cx="9284458" cy="3155636"/>
           </a:xfrm>
         </p:grpSpPr>
-        <p:pic>
-          <p:nvPicPr>
-            <p:cNvPr id="11" name="Picture 10" descr="A black silhouette of a person&#10;&#10;Description automatically generated">
+        <p:sp>
+          <p:nvSpPr>
+            <p:cNvPr id="35" name="Rectangle 34">
               <a:extLst>
                 <a:ext uri="{FF2B5EF4-FFF2-40B4-BE49-F238E27FC236}">
-                  <a16:creationId xmlns:a16="http://schemas.microsoft.com/office/drawing/2014/main" id="{7EC5D426-DF8A-683C-E969-F8DBCF70ABC9}"/>
-                </a:ext>
-              </a:extLst>
-            </p:cNvPr>
-            <p:cNvPicPr>
-              <a:picLocks noChangeAspect="1"/>
-            </p:cNvPicPr>
-            <p:nvPr/>
-          </p:nvPicPr>
-          <p:blipFill>
-            <a:blip r:embed="rId2">
-              <a:alphaModFix amt="70000"/>
-              <a:extLst>
-                <a:ext uri="{28A0092B-C50C-407E-A947-70E740481C1C}">
-                  <a14:useLocalDpi xmlns:a14="http://schemas.microsoft.com/office/drawing/2010/main" val="0"/>
-                </a:ext>
-              </a:extLst>
-            </a:blip>
-            <a:stretch>
-              <a:fillRect/>
-            </a:stretch>
-          </p:blipFill>
-          <p:spPr>
-            <a:xfrm>
-              <a:off x="392188" y="1627631"/>
-              <a:ext cx="981963" cy="981963"/>
-            </a:xfrm>
-            <a:prstGeom prst="rect">
-              <a:avLst/>
-            </a:prstGeom>
-          </p:spPr>
-        </p:pic>
-        <p:pic>
-          <p:nvPicPr>
-            <p:cNvPr id="4" name="Picture 3" descr="A computer with a mouse and keyboard&#10;&#10;Description automatically generated">
-              <a:extLst>
-                <a:ext uri="{FF2B5EF4-FFF2-40B4-BE49-F238E27FC236}">
-                  <a16:creationId xmlns:a16="http://schemas.microsoft.com/office/drawing/2014/main" id="{C698898C-9EFA-1734-1601-AD3B5A806C04}"/>
-                </a:ext>
-              </a:extLst>
-            </p:cNvPr>
-            <p:cNvPicPr>
-              <a:picLocks noChangeAspect="1"/>
-            </p:cNvPicPr>
-            <p:nvPr/>
-          </p:nvPicPr>
-          <p:blipFill>
-            <a:blip r:embed="rId3"/>
-            <a:stretch>
-              <a:fillRect/>
-            </a:stretch>
-          </p:blipFill>
-          <p:spPr>
-            <a:xfrm>
-              <a:off x="811915" y="2273721"/>
-              <a:ext cx="1342005" cy="981963"/>
-            </a:xfrm>
-            <a:prstGeom prst="rect">
-              <a:avLst/>
-            </a:prstGeom>
-          </p:spPr>
-        </p:pic>
-        <p:cxnSp>
-          <p:nvCxnSpPr>
-            <p:cNvPr id="8" name="Straight Arrow Connector 7">
-              <a:extLst>
-                <a:ext uri="{FF2B5EF4-FFF2-40B4-BE49-F238E27FC236}">
-                  <a16:creationId xmlns:a16="http://schemas.microsoft.com/office/drawing/2014/main" id="{9ADC8162-E2A7-C88F-8779-F6C531BF2D79}"/>
-                </a:ext>
-              </a:extLst>
-            </p:cNvPr>
-            <p:cNvCxnSpPr>
-              <a:cxnSpLocks/>
-            </p:cNvCxnSpPr>
-            <p:nvPr/>
-          </p:nvCxnSpPr>
-          <p:spPr>
-            <a:xfrm>
-              <a:off x="2153920" y="2764702"/>
-              <a:ext cx="1391920" cy="0"/>
-            </a:xfrm>
-            <a:prstGeom prst="straightConnector1">
-              <a:avLst/>
-            </a:prstGeom>
-            <a:ln>
-              <a:solidFill>
-                <a:schemeClr val="tx1"/>
-              </a:solidFill>
-              <a:tailEnd type="triangle"/>
-            </a:ln>
-          </p:spPr>
-          <p:style>
-            <a:lnRef idx="1">
-              <a:schemeClr val="accent1"/>
-            </a:lnRef>
-            <a:fillRef idx="0">
-              <a:schemeClr val="accent1"/>
-            </a:fillRef>
-            <a:effectRef idx="0">
-              <a:schemeClr val="accent1"/>
-            </a:effectRef>
-            <a:fontRef idx="minor">
-              <a:schemeClr val="tx1"/>
-            </a:fontRef>
-          </p:style>
-        </p:cxnSp>
-        <p:pic>
-          <p:nvPicPr>
-            <p:cNvPr id="9" name="Picture 8" descr="A computer with a mouse and keyboard&#10;&#10;Description automatically generated">
-              <a:extLst>
-                <a:ext uri="{FF2B5EF4-FFF2-40B4-BE49-F238E27FC236}">
-                  <a16:creationId xmlns:a16="http://schemas.microsoft.com/office/drawing/2014/main" id="{3BA39735-DB23-928A-A9B6-672FA0A925BC}"/>
-                </a:ext>
-              </a:extLst>
-            </p:cNvPr>
-            <p:cNvPicPr>
-              <a:picLocks noChangeAspect="1"/>
-            </p:cNvPicPr>
-            <p:nvPr/>
-          </p:nvPicPr>
-          <p:blipFill>
-            <a:blip r:embed="rId3"/>
-            <a:stretch>
-              <a:fillRect/>
-            </a:stretch>
-          </p:blipFill>
-          <p:spPr>
-            <a:xfrm>
-              <a:off x="3609703" y="2273721"/>
-              <a:ext cx="1342005" cy="981963"/>
-            </a:xfrm>
-            <a:prstGeom prst="rect">
-              <a:avLst/>
-            </a:prstGeom>
-          </p:spPr>
-        </p:pic>
-        <p:sp>
-          <p:nvSpPr>
-            <p:cNvPr id="12" name="TextBox 11">
-              <a:extLst>
-                <a:ext uri="{FF2B5EF4-FFF2-40B4-BE49-F238E27FC236}">
-                  <a16:creationId xmlns:a16="http://schemas.microsoft.com/office/drawing/2014/main" id="{A7DE73A7-63F7-206A-98C8-3A4B40D0EB74}"/>
-                </a:ext>
-              </a:extLst>
-            </p:cNvPr>
-            <p:cNvSpPr txBox="1"/>
-            <p:nvPr/>
-          </p:nvSpPr>
-          <p:spPr>
-            <a:xfrm>
-              <a:off x="2606865" y="2739897"/>
-              <a:ext cx="420308" cy="307777"/>
-            </a:xfrm>
-            <a:prstGeom prst="rect">
-              <a:avLst/>
-            </a:prstGeom>
-            <a:noFill/>
-          </p:spPr>
-          <p:txBody>
-            <a:bodyPr wrap="none" rtlCol="0">
-              <a:spAutoFit/>
-            </a:bodyPr>
-            <a:lstStyle/>
-            <a:p>
-              <a:r>
-                <a:rPr lang="en-GB" sz="1400" dirty="0" err="1"/>
-                <a:t>ssh</a:t>
-              </a:r>
-              <a:endParaRPr lang="en-NL" sz="1400" dirty="0"/>
-            </a:p>
-          </p:txBody>
-        </p:sp>
-        <p:sp>
-          <p:nvSpPr>
-            <p:cNvPr id="13" name="TextBox 12">
-              <a:extLst>
-                <a:ext uri="{FF2B5EF4-FFF2-40B4-BE49-F238E27FC236}">
-                  <a16:creationId xmlns:a16="http://schemas.microsoft.com/office/drawing/2014/main" id="{82F1EF38-77B9-21F6-01EA-6EE3AD52DFB1}"/>
-                </a:ext>
-              </a:extLst>
-            </p:cNvPr>
-            <p:cNvSpPr txBox="1"/>
-            <p:nvPr/>
-          </p:nvSpPr>
-          <p:spPr>
-            <a:xfrm>
-              <a:off x="2270554" y="2487703"/>
-              <a:ext cx="1158651" cy="276999"/>
-            </a:xfrm>
-            <a:prstGeom prst="rect">
-              <a:avLst/>
-            </a:prstGeom>
-            <a:noFill/>
-          </p:spPr>
-          <p:txBody>
-            <a:bodyPr wrap="none" rtlCol="0">
-              <a:spAutoFit/>
-            </a:bodyPr>
-            <a:lstStyle/>
-            <a:p>
-              <a:r>
-                <a:rPr lang="en-GB" sz="1200" b="1" dirty="0"/>
-                <a:t>connect to HPC</a:t>
-              </a:r>
-              <a:endParaRPr lang="en-NL" sz="1200" b="1" dirty="0"/>
-            </a:p>
-          </p:txBody>
-        </p:sp>
-        <p:sp>
-          <p:nvSpPr>
-            <p:cNvPr id="14" name="TextBox 13">
-              <a:extLst>
-                <a:ext uri="{FF2B5EF4-FFF2-40B4-BE49-F238E27FC236}">
-                  <a16:creationId xmlns:a16="http://schemas.microsoft.com/office/drawing/2014/main" id="{73F080E9-955E-80F8-3A75-F80196C57240}"/>
-                </a:ext>
-              </a:extLst>
-            </p:cNvPr>
-            <p:cNvSpPr txBox="1"/>
-            <p:nvPr/>
-          </p:nvSpPr>
-          <p:spPr>
-            <a:xfrm>
-              <a:off x="3843455" y="1602231"/>
-              <a:ext cx="1172116" cy="584775"/>
-            </a:xfrm>
-            <a:prstGeom prst="rect">
-              <a:avLst/>
-            </a:prstGeom>
-            <a:noFill/>
-          </p:spPr>
-          <p:txBody>
-            <a:bodyPr wrap="none" rtlCol="0">
-              <a:spAutoFit/>
-            </a:bodyPr>
-            <a:lstStyle/>
-            <a:p>
-              <a:pPr algn="ctr"/>
-              <a:r>
-                <a:rPr lang="en-GB" sz="1600" b="1" dirty="0"/>
-                <a:t>Login/Head</a:t>
-              </a:r>
-            </a:p>
-            <a:p>
-              <a:pPr algn="ctr"/>
-              <a:r>
-                <a:rPr lang="en-GB" sz="1600" b="1" dirty="0"/>
-                <a:t> Node</a:t>
-              </a:r>
-              <a:endParaRPr lang="en-NL" sz="1600" b="1" dirty="0"/>
-            </a:p>
-          </p:txBody>
-        </p:sp>
-        <p:sp>
-          <p:nvSpPr>
-            <p:cNvPr id="16" name="TextBox 15">
-              <a:extLst>
-                <a:ext uri="{FF2B5EF4-FFF2-40B4-BE49-F238E27FC236}">
-                  <a16:creationId xmlns:a16="http://schemas.microsoft.com/office/drawing/2014/main" id="{A785D0CF-B623-FB00-9F1A-081910D0DEB3}"/>
-                </a:ext>
-              </a:extLst>
-            </p:cNvPr>
-            <p:cNvSpPr txBox="1"/>
-            <p:nvPr/>
-          </p:nvSpPr>
-          <p:spPr>
-            <a:xfrm>
-              <a:off x="3401139" y="3290500"/>
-              <a:ext cx="1759131" cy="276999"/>
-            </a:xfrm>
-            <a:prstGeom prst="rect">
-              <a:avLst/>
-            </a:prstGeom>
-            <a:noFill/>
-          </p:spPr>
-          <p:txBody>
-            <a:bodyPr wrap="square">
-              <a:spAutoFit/>
-            </a:bodyPr>
-            <a:lstStyle/>
-            <a:p>
-              <a:r>
-                <a:rPr lang="en-GB" sz="1200" i="1" dirty="0"/>
-                <a:t>omics-h0.science.uva.nl</a:t>
-              </a:r>
-              <a:endParaRPr lang="en-NL" sz="1200" dirty="0"/>
-            </a:p>
-          </p:txBody>
-        </p:sp>
-        <p:cxnSp>
-          <p:nvCxnSpPr>
-            <p:cNvPr id="17" name="Straight Arrow Connector 16">
-              <a:extLst>
-                <a:ext uri="{FF2B5EF4-FFF2-40B4-BE49-F238E27FC236}">
-                  <a16:creationId xmlns:a16="http://schemas.microsoft.com/office/drawing/2014/main" id="{A87CA75D-1E7B-B681-EB5D-218B3C101057}"/>
-                </a:ext>
-              </a:extLst>
-            </p:cNvPr>
-            <p:cNvCxnSpPr>
-              <a:cxnSpLocks/>
-            </p:cNvCxnSpPr>
-            <p:nvPr/>
-          </p:nvCxnSpPr>
-          <p:spPr>
-            <a:xfrm>
-              <a:off x="5070157" y="2739897"/>
-              <a:ext cx="1391920" cy="0"/>
-            </a:xfrm>
-            <a:prstGeom prst="straightConnector1">
-              <a:avLst/>
-            </a:prstGeom>
-            <a:ln>
-              <a:solidFill>
-                <a:schemeClr val="tx1"/>
-              </a:solidFill>
-              <a:tailEnd type="triangle"/>
-            </a:ln>
-          </p:spPr>
-          <p:style>
-            <a:lnRef idx="1">
-              <a:schemeClr val="accent1"/>
-            </a:lnRef>
-            <a:fillRef idx="0">
-              <a:schemeClr val="accent1"/>
-            </a:fillRef>
-            <a:effectRef idx="0">
-              <a:schemeClr val="accent1"/>
-            </a:effectRef>
-            <a:fontRef idx="minor">
-              <a:schemeClr val="tx1"/>
-            </a:fontRef>
-          </p:style>
-        </p:cxnSp>
-        <p:sp>
-          <p:nvSpPr>
-            <p:cNvPr id="20" name="Rectangle 19">
-              <a:extLst>
-                <a:ext uri="{FF2B5EF4-FFF2-40B4-BE49-F238E27FC236}">
-                  <a16:creationId xmlns:a16="http://schemas.microsoft.com/office/drawing/2014/main" id="{6E44D60A-6B2E-C44B-EB33-CD93BAA6C522}"/>
+                  <a16:creationId xmlns:a16="http://schemas.microsoft.com/office/drawing/2014/main" id="{0009ED84-3AB5-DDF4-355B-43DA6A761725}"/>
                 </a:ext>
               </a:extLst>
             </p:cNvPr>
@@ -3714,33 +3378,18 @@
           </p:nvSpPr>
           <p:spPr>
             <a:xfrm>
-              <a:off x="6782298" y="2311032"/>
-              <a:ext cx="660400" cy="944652"/>
+              <a:off x="309479" y="1511559"/>
+              <a:ext cx="9275656" cy="2957804"/>
             </a:xfrm>
             <a:prstGeom prst="rect">
               <a:avLst/>
             </a:prstGeom>
             <a:solidFill>
-              <a:schemeClr val="tx1">
-                <a:lumMod val="85000"/>
-                <a:lumOff val="15000"/>
-                <a:alpha val="99000"/>
-              </a:schemeClr>
+              <a:schemeClr val="bg1"/>
             </a:solidFill>
-            <a:scene3d>
-              <a:camera prst="isometricRightUp"/>
-              <a:lightRig rig="threePt" dir="t"/>
-            </a:scene3d>
-            <a:sp3d extrusionH="374650" contourW="12700">
-              <a:extrusionClr>
-                <a:schemeClr val="bg2">
-                  <a:lumMod val="50000"/>
-                </a:schemeClr>
-              </a:extrusionClr>
-              <a:contourClr>
-                <a:schemeClr val="tx1"/>
-              </a:contourClr>
-            </a:sp3d>
+            <a:ln>
+              <a:noFill/>
+            </a:ln>
           </p:spPr>
           <p:style>
             <a:lnRef idx="2">
@@ -3763,533 +3412,958 @@
             <a:lstStyle/>
             <a:p>
               <a:pPr algn="ctr"/>
-              <a:endParaRPr lang="en-NL" dirty="0"/>
+              <a:endParaRPr lang="en-NL"/>
             </a:p>
           </p:txBody>
         </p:sp>
-        <p:sp>
-          <p:nvSpPr>
-            <p:cNvPr id="24" name="Rectangle 23">
+        <p:grpSp>
+          <p:nvGrpSpPr>
+            <p:cNvPr id="34" name="Group 33">
               <a:extLst>
                 <a:ext uri="{FF2B5EF4-FFF2-40B4-BE49-F238E27FC236}">
-                  <a16:creationId xmlns:a16="http://schemas.microsoft.com/office/drawing/2014/main" id="{BC02299E-8A73-C326-0B55-121B2775C5CA}"/>
+                  <a16:creationId xmlns:a16="http://schemas.microsoft.com/office/drawing/2014/main" id="{2B8DAB36-1237-199B-C035-36D8E68DD79A}"/>
                 </a:ext>
               </a:extLst>
             </p:cNvPr>
-            <p:cNvSpPr/>
+            <p:cNvGrpSpPr/>
             <p:nvPr/>
-          </p:nvSpPr>
-          <p:spPr>
+          </p:nvGrpSpPr>
+          <p:grpSpPr>
             <a:xfrm>
-              <a:off x="7304770" y="2311032"/>
-              <a:ext cx="660400" cy="944652"/>
+              <a:off x="309479" y="1602231"/>
+              <a:ext cx="9284458" cy="3064964"/>
+              <a:chOff x="309479" y="1602231"/>
+              <a:chExt cx="9284458" cy="3064964"/>
             </a:xfrm>
-            <a:prstGeom prst="rect">
-              <a:avLst/>
-            </a:prstGeom>
-            <a:solidFill>
-              <a:schemeClr val="tx1">
-                <a:lumMod val="85000"/>
-                <a:lumOff val="15000"/>
-                <a:alpha val="99000"/>
-              </a:schemeClr>
-            </a:solidFill>
-            <a:scene3d>
-              <a:camera prst="isometricRightUp"/>
-              <a:lightRig rig="threePt" dir="t"/>
-            </a:scene3d>
-            <a:sp3d extrusionH="374650" contourW="12700">
-              <a:extrusionClr>
-                <a:schemeClr val="bg2">
-                  <a:lumMod val="50000"/>
+          </p:grpSpPr>
+          <p:pic>
+            <p:nvPicPr>
+              <p:cNvPr id="11" name="Picture 10" descr="A black silhouette of a person&#10;&#10;Description automatically generated">
+                <a:extLst>
+                  <a:ext uri="{FF2B5EF4-FFF2-40B4-BE49-F238E27FC236}">
+                    <a16:creationId xmlns:a16="http://schemas.microsoft.com/office/drawing/2014/main" id="{7EC5D426-DF8A-683C-E969-F8DBCF70ABC9}"/>
+                  </a:ext>
+                </a:extLst>
+              </p:cNvPr>
+              <p:cNvPicPr>
+                <a:picLocks noChangeAspect="1"/>
+              </p:cNvPicPr>
+              <p:nvPr/>
+            </p:nvPicPr>
+            <p:blipFill>
+              <a:blip r:embed="rId2">
+                <a:alphaModFix amt="70000"/>
+                <a:extLst>
+                  <a:ext uri="{28A0092B-C50C-407E-A947-70E740481C1C}">
+                    <a14:useLocalDpi xmlns:a14="http://schemas.microsoft.com/office/drawing/2010/main" val="0"/>
+                  </a:ext>
+                </a:extLst>
+              </a:blip>
+              <a:stretch>
+                <a:fillRect/>
+              </a:stretch>
+            </p:blipFill>
+            <p:spPr>
+              <a:xfrm>
+                <a:off x="392188" y="1627631"/>
+                <a:ext cx="981963" cy="981963"/>
+              </a:xfrm>
+              <a:prstGeom prst="rect">
+                <a:avLst/>
+              </a:prstGeom>
+            </p:spPr>
+          </p:pic>
+          <p:pic>
+            <p:nvPicPr>
+              <p:cNvPr id="4" name="Picture 3" descr="A computer with a mouse and keyboard&#10;&#10;Description automatically generated">
+                <a:extLst>
+                  <a:ext uri="{FF2B5EF4-FFF2-40B4-BE49-F238E27FC236}">
+                    <a16:creationId xmlns:a16="http://schemas.microsoft.com/office/drawing/2014/main" id="{C698898C-9EFA-1734-1601-AD3B5A806C04}"/>
+                  </a:ext>
+                </a:extLst>
+              </p:cNvPr>
+              <p:cNvPicPr>
+                <a:picLocks noChangeAspect="1"/>
+              </p:cNvPicPr>
+              <p:nvPr/>
+            </p:nvPicPr>
+            <p:blipFill>
+              <a:blip r:embed="rId3"/>
+              <a:stretch>
+                <a:fillRect/>
+              </a:stretch>
+            </p:blipFill>
+            <p:spPr>
+              <a:xfrm>
+                <a:off x="811915" y="2273721"/>
+                <a:ext cx="1342005" cy="981963"/>
+              </a:xfrm>
+              <a:prstGeom prst="rect">
+                <a:avLst/>
+              </a:prstGeom>
+            </p:spPr>
+          </p:pic>
+          <p:cxnSp>
+            <p:nvCxnSpPr>
+              <p:cNvPr id="8" name="Straight Arrow Connector 7">
+                <a:extLst>
+                  <a:ext uri="{FF2B5EF4-FFF2-40B4-BE49-F238E27FC236}">
+                    <a16:creationId xmlns:a16="http://schemas.microsoft.com/office/drawing/2014/main" id="{9ADC8162-E2A7-C88F-8779-F6C531BF2D79}"/>
+                  </a:ext>
+                </a:extLst>
+              </p:cNvPr>
+              <p:cNvCxnSpPr>
+                <a:cxnSpLocks/>
+              </p:cNvCxnSpPr>
+              <p:nvPr/>
+            </p:nvCxnSpPr>
+            <p:spPr>
+              <a:xfrm>
+                <a:off x="2153920" y="2764702"/>
+                <a:ext cx="1391920" cy="0"/>
+              </a:xfrm>
+              <a:prstGeom prst="straightConnector1">
+                <a:avLst/>
+              </a:prstGeom>
+              <a:ln>
+                <a:solidFill>
+                  <a:schemeClr val="tx1"/>
+                </a:solidFill>
+                <a:tailEnd type="triangle"/>
+              </a:ln>
+            </p:spPr>
+            <p:style>
+              <a:lnRef idx="1">
+                <a:schemeClr val="accent1"/>
+              </a:lnRef>
+              <a:fillRef idx="0">
+                <a:schemeClr val="accent1"/>
+              </a:fillRef>
+              <a:effectRef idx="0">
+                <a:schemeClr val="accent1"/>
+              </a:effectRef>
+              <a:fontRef idx="minor">
+                <a:schemeClr val="tx1"/>
+              </a:fontRef>
+            </p:style>
+          </p:cxnSp>
+          <p:pic>
+            <p:nvPicPr>
+              <p:cNvPr id="9" name="Picture 8" descr="A computer with a mouse and keyboard&#10;&#10;Description automatically generated">
+                <a:extLst>
+                  <a:ext uri="{FF2B5EF4-FFF2-40B4-BE49-F238E27FC236}">
+                    <a16:creationId xmlns:a16="http://schemas.microsoft.com/office/drawing/2014/main" id="{3BA39735-DB23-928A-A9B6-672FA0A925BC}"/>
+                  </a:ext>
+                </a:extLst>
+              </p:cNvPr>
+              <p:cNvPicPr>
+                <a:picLocks noChangeAspect="1"/>
+              </p:cNvPicPr>
+              <p:nvPr/>
+            </p:nvPicPr>
+            <p:blipFill>
+              <a:blip r:embed="rId3"/>
+              <a:stretch>
+                <a:fillRect/>
+              </a:stretch>
+            </p:blipFill>
+            <p:spPr>
+              <a:xfrm>
+                <a:off x="3609703" y="2273721"/>
+                <a:ext cx="1342005" cy="981963"/>
+              </a:xfrm>
+              <a:prstGeom prst="rect">
+                <a:avLst/>
+              </a:prstGeom>
+            </p:spPr>
+          </p:pic>
+          <p:sp>
+            <p:nvSpPr>
+              <p:cNvPr id="12" name="TextBox 11">
+                <a:extLst>
+                  <a:ext uri="{FF2B5EF4-FFF2-40B4-BE49-F238E27FC236}">
+                    <a16:creationId xmlns:a16="http://schemas.microsoft.com/office/drawing/2014/main" id="{A7DE73A7-63F7-206A-98C8-3A4B40D0EB74}"/>
+                  </a:ext>
+                </a:extLst>
+              </p:cNvPr>
+              <p:cNvSpPr txBox="1"/>
+              <p:nvPr/>
+            </p:nvSpPr>
+            <p:spPr>
+              <a:xfrm>
+                <a:off x="2606865" y="2739897"/>
+                <a:ext cx="420308" cy="307777"/>
+              </a:xfrm>
+              <a:prstGeom prst="rect">
+                <a:avLst/>
+              </a:prstGeom>
+              <a:noFill/>
+            </p:spPr>
+            <p:txBody>
+              <a:bodyPr wrap="none" rtlCol="0">
+                <a:spAutoFit/>
+              </a:bodyPr>
+              <a:lstStyle/>
+              <a:p>
+                <a:r>
+                  <a:rPr lang="en-GB" sz="1400" dirty="0" err="1"/>
+                  <a:t>ssh</a:t>
+                </a:r>
+                <a:endParaRPr lang="en-NL" sz="1400" dirty="0"/>
+              </a:p>
+            </p:txBody>
+          </p:sp>
+          <p:sp>
+            <p:nvSpPr>
+              <p:cNvPr id="13" name="TextBox 12">
+                <a:extLst>
+                  <a:ext uri="{FF2B5EF4-FFF2-40B4-BE49-F238E27FC236}">
+                    <a16:creationId xmlns:a16="http://schemas.microsoft.com/office/drawing/2014/main" id="{82F1EF38-77B9-21F6-01EA-6EE3AD52DFB1}"/>
+                  </a:ext>
+                </a:extLst>
+              </p:cNvPr>
+              <p:cNvSpPr txBox="1"/>
+              <p:nvPr/>
+            </p:nvSpPr>
+            <p:spPr>
+              <a:xfrm>
+                <a:off x="2270554" y="2487703"/>
+                <a:ext cx="1158651" cy="276999"/>
+              </a:xfrm>
+              <a:prstGeom prst="rect">
+                <a:avLst/>
+              </a:prstGeom>
+              <a:noFill/>
+            </p:spPr>
+            <p:txBody>
+              <a:bodyPr wrap="none" rtlCol="0">
+                <a:spAutoFit/>
+              </a:bodyPr>
+              <a:lstStyle/>
+              <a:p>
+                <a:r>
+                  <a:rPr lang="en-GB" sz="1200" b="1" dirty="0"/>
+                  <a:t>connect to HPC</a:t>
+                </a:r>
+                <a:endParaRPr lang="en-NL" sz="1200" b="1" dirty="0"/>
+              </a:p>
+            </p:txBody>
+          </p:sp>
+          <p:sp>
+            <p:nvSpPr>
+              <p:cNvPr id="14" name="TextBox 13">
+                <a:extLst>
+                  <a:ext uri="{FF2B5EF4-FFF2-40B4-BE49-F238E27FC236}">
+                    <a16:creationId xmlns:a16="http://schemas.microsoft.com/office/drawing/2014/main" id="{73F080E9-955E-80F8-3A75-F80196C57240}"/>
+                  </a:ext>
+                </a:extLst>
+              </p:cNvPr>
+              <p:cNvSpPr txBox="1"/>
+              <p:nvPr/>
+            </p:nvSpPr>
+            <p:spPr>
+              <a:xfrm>
+                <a:off x="3843455" y="1602231"/>
+                <a:ext cx="1172116" cy="584775"/>
+              </a:xfrm>
+              <a:prstGeom prst="rect">
+                <a:avLst/>
+              </a:prstGeom>
+              <a:noFill/>
+            </p:spPr>
+            <p:txBody>
+              <a:bodyPr wrap="none" rtlCol="0">
+                <a:spAutoFit/>
+              </a:bodyPr>
+              <a:lstStyle/>
+              <a:p>
+                <a:pPr algn="ctr"/>
+                <a:r>
+                  <a:rPr lang="en-GB" sz="1600" b="1" dirty="0"/>
+                  <a:t>Login/Head</a:t>
+                </a:r>
+              </a:p>
+              <a:p>
+                <a:pPr algn="ctr"/>
+                <a:r>
+                  <a:rPr lang="en-GB" sz="1600" b="1" dirty="0"/>
+                  <a:t> Node</a:t>
+                </a:r>
+                <a:endParaRPr lang="en-NL" sz="1600" b="1" dirty="0"/>
+              </a:p>
+            </p:txBody>
+          </p:sp>
+          <p:sp>
+            <p:nvSpPr>
+              <p:cNvPr id="16" name="TextBox 15">
+                <a:extLst>
+                  <a:ext uri="{FF2B5EF4-FFF2-40B4-BE49-F238E27FC236}">
+                    <a16:creationId xmlns:a16="http://schemas.microsoft.com/office/drawing/2014/main" id="{A785D0CF-B623-FB00-9F1A-081910D0DEB3}"/>
+                  </a:ext>
+                </a:extLst>
+              </p:cNvPr>
+              <p:cNvSpPr txBox="1"/>
+              <p:nvPr/>
+            </p:nvSpPr>
+            <p:spPr>
+              <a:xfrm>
+                <a:off x="3401139" y="3290500"/>
+                <a:ext cx="1759131" cy="276999"/>
+              </a:xfrm>
+              <a:prstGeom prst="rect">
+                <a:avLst/>
+              </a:prstGeom>
+              <a:noFill/>
+            </p:spPr>
+            <p:txBody>
+              <a:bodyPr wrap="square">
+                <a:spAutoFit/>
+              </a:bodyPr>
+              <a:lstStyle/>
+              <a:p>
+                <a:r>
+                  <a:rPr lang="en-GB" sz="1200" i="1" dirty="0"/>
+                  <a:t>omics-h0.science.uva.nl</a:t>
+                </a:r>
+                <a:endParaRPr lang="en-NL" sz="1200" dirty="0"/>
+              </a:p>
+            </p:txBody>
+          </p:sp>
+          <p:cxnSp>
+            <p:nvCxnSpPr>
+              <p:cNvPr id="17" name="Straight Arrow Connector 16">
+                <a:extLst>
+                  <a:ext uri="{FF2B5EF4-FFF2-40B4-BE49-F238E27FC236}">
+                    <a16:creationId xmlns:a16="http://schemas.microsoft.com/office/drawing/2014/main" id="{A87CA75D-1E7B-B681-EB5D-218B3C101057}"/>
+                  </a:ext>
+                </a:extLst>
+              </p:cNvPr>
+              <p:cNvCxnSpPr>
+                <a:cxnSpLocks/>
+              </p:cNvCxnSpPr>
+              <p:nvPr/>
+            </p:nvCxnSpPr>
+            <p:spPr>
+              <a:xfrm>
+                <a:off x="5070157" y="2739897"/>
+                <a:ext cx="1391920" cy="0"/>
+              </a:xfrm>
+              <a:prstGeom prst="straightConnector1">
+                <a:avLst/>
+              </a:prstGeom>
+              <a:ln>
+                <a:solidFill>
+                  <a:schemeClr val="tx1"/>
+                </a:solidFill>
+                <a:tailEnd type="triangle"/>
+              </a:ln>
+            </p:spPr>
+            <p:style>
+              <a:lnRef idx="1">
+                <a:schemeClr val="accent1"/>
+              </a:lnRef>
+              <a:fillRef idx="0">
+                <a:schemeClr val="accent1"/>
+              </a:fillRef>
+              <a:effectRef idx="0">
+                <a:schemeClr val="accent1"/>
+              </a:effectRef>
+              <a:fontRef idx="minor">
+                <a:schemeClr val="tx1"/>
+              </a:fontRef>
+            </p:style>
+          </p:cxnSp>
+          <p:sp>
+            <p:nvSpPr>
+              <p:cNvPr id="20" name="Rectangle 19">
+                <a:extLst>
+                  <a:ext uri="{FF2B5EF4-FFF2-40B4-BE49-F238E27FC236}">
+                    <a16:creationId xmlns:a16="http://schemas.microsoft.com/office/drawing/2014/main" id="{6E44D60A-6B2E-C44B-EB33-CD93BAA6C522}"/>
+                  </a:ext>
+                </a:extLst>
+              </p:cNvPr>
+              <p:cNvSpPr/>
+              <p:nvPr/>
+            </p:nvSpPr>
+            <p:spPr>
+              <a:xfrm>
+                <a:off x="6782298" y="2311032"/>
+                <a:ext cx="660400" cy="944652"/>
+              </a:xfrm>
+              <a:prstGeom prst="rect">
+                <a:avLst/>
+              </a:prstGeom>
+              <a:solidFill>
+                <a:schemeClr val="tx1">
+                  <a:lumMod val="85000"/>
+                  <a:lumOff val="15000"/>
+                  <a:alpha val="99000"/>
                 </a:schemeClr>
-              </a:extrusionClr>
-              <a:contourClr>
-                <a:schemeClr val="tx1"/>
-              </a:contourClr>
-            </a:sp3d>
-          </p:spPr>
-          <p:style>
-            <a:lnRef idx="2">
-              <a:schemeClr val="accent1">
-                <a:shade val="15000"/>
-              </a:schemeClr>
-            </a:lnRef>
-            <a:fillRef idx="1">
-              <a:schemeClr val="accent1"/>
-            </a:fillRef>
-            <a:effectRef idx="0">
-              <a:schemeClr val="accent1"/>
-            </a:effectRef>
-            <a:fontRef idx="minor">
-              <a:schemeClr val="lt1"/>
-            </a:fontRef>
-          </p:style>
-          <p:txBody>
-            <a:bodyPr rtlCol="0" anchor="ctr"/>
-            <a:lstStyle/>
-            <a:p>
-              <a:pPr algn="ctr"/>
-              <a:endParaRPr lang="en-NL" dirty="0"/>
-            </a:p>
-          </p:txBody>
-        </p:sp>
-        <p:sp>
-          <p:nvSpPr>
-            <p:cNvPr id="23" name="Rectangle 22">
-              <a:extLst>
-                <a:ext uri="{FF2B5EF4-FFF2-40B4-BE49-F238E27FC236}">
-                  <a16:creationId xmlns:a16="http://schemas.microsoft.com/office/drawing/2014/main" id="{D0B987B5-277C-C6A9-AF7D-6DCFD7FD7B05}"/>
-                </a:ext>
-              </a:extLst>
-            </p:cNvPr>
-            <p:cNvSpPr/>
-            <p:nvPr/>
-          </p:nvSpPr>
-          <p:spPr>
-            <a:xfrm>
-              <a:off x="7878343" y="2311032"/>
-              <a:ext cx="660400" cy="944652"/>
-            </a:xfrm>
-            <a:prstGeom prst="rect">
-              <a:avLst/>
-            </a:prstGeom>
-            <a:solidFill>
-              <a:schemeClr val="tx1">
-                <a:lumMod val="85000"/>
-                <a:lumOff val="15000"/>
-                <a:alpha val="99000"/>
-              </a:schemeClr>
-            </a:solidFill>
-            <a:scene3d>
-              <a:camera prst="isometricRightUp"/>
-              <a:lightRig rig="threePt" dir="t"/>
-            </a:scene3d>
-            <a:sp3d extrusionH="374650" contourW="12700">
-              <a:extrusionClr>
-                <a:schemeClr val="bg2">
-                  <a:lumMod val="50000"/>
+              </a:solidFill>
+              <a:scene3d>
+                <a:camera prst="isometricRightUp"/>
+                <a:lightRig rig="threePt" dir="t"/>
+              </a:scene3d>
+              <a:sp3d extrusionH="374650" contourW="12700">
+                <a:extrusionClr>
+                  <a:schemeClr val="bg2">
+                    <a:lumMod val="50000"/>
+                  </a:schemeClr>
+                </a:extrusionClr>
+                <a:contourClr>
+                  <a:schemeClr val="tx1"/>
+                </a:contourClr>
+              </a:sp3d>
+            </p:spPr>
+            <p:style>
+              <a:lnRef idx="2">
+                <a:schemeClr val="accent1">
+                  <a:shade val="15000"/>
                 </a:schemeClr>
-              </a:extrusionClr>
-              <a:contourClr>
-                <a:schemeClr val="tx1"/>
-              </a:contourClr>
-            </a:sp3d>
-          </p:spPr>
-          <p:style>
-            <a:lnRef idx="2">
-              <a:schemeClr val="accent1">
-                <a:shade val="15000"/>
-              </a:schemeClr>
-            </a:lnRef>
-            <a:fillRef idx="1">
-              <a:schemeClr val="accent1"/>
-            </a:fillRef>
-            <a:effectRef idx="0">
-              <a:schemeClr val="accent1"/>
-            </a:effectRef>
-            <a:fontRef idx="minor">
-              <a:schemeClr val="lt1"/>
-            </a:fontRef>
-          </p:style>
-          <p:txBody>
-            <a:bodyPr rtlCol="0" anchor="ctr"/>
-            <a:lstStyle/>
-            <a:p>
-              <a:pPr algn="ctr"/>
-              <a:endParaRPr lang="en-NL" dirty="0"/>
-            </a:p>
-          </p:txBody>
-        </p:sp>
-        <p:sp>
-          <p:nvSpPr>
-            <p:cNvPr id="25" name="Rectangle 24">
-              <a:extLst>
-                <a:ext uri="{FF2B5EF4-FFF2-40B4-BE49-F238E27FC236}">
-                  <a16:creationId xmlns:a16="http://schemas.microsoft.com/office/drawing/2014/main" id="{B81BD75F-D1B6-57CD-FB7B-1E7E23FD105B}"/>
-                </a:ext>
-              </a:extLst>
-            </p:cNvPr>
-            <p:cNvSpPr/>
-            <p:nvPr/>
-          </p:nvSpPr>
-          <p:spPr>
-            <a:xfrm>
-              <a:off x="8400815" y="2311032"/>
-              <a:ext cx="660400" cy="944652"/>
-            </a:xfrm>
-            <a:prstGeom prst="rect">
-              <a:avLst/>
-            </a:prstGeom>
-            <a:solidFill>
-              <a:schemeClr val="tx1">
-                <a:lumMod val="85000"/>
-                <a:lumOff val="15000"/>
-                <a:alpha val="99000"/>
-              </a:schemeClr>
-            </a:solidFill>
-            <a:scene3d>
-              <a:camera prst="isometricRightUp"/>
-              <a:lightRig rig="threePt" dir="t"/>
-            </a:scene3d>
-            <a:sp3d extrusionH="374650" contourW="12700">
-              <a:extrusionClr>
-                <a:schemeClr val="bg2">
-                  <a:lumMod val="50000"/>
+              </a:lnRef>
+              <a:fillRef idx="1">
+                <a:schemeClr val="accent1"/>
+              </a:fillRef>
+              <a:effectRef idx="0">
+                <a:schemeClr val="accent1"/>
+              </a:effectRef>
+              <a:fontRef idx="minor">
+                <a:schemeClr val="lt1"/>
+              </a:fontRef>
+            </p:style>
+            <p:txBody>
+              <a:bodyPr rtlCol="0" anchor="ctr"/>
+              <a:lstStyle/>
+              <a:p>
+                <a:pPr algn="ctr"/>
+                <a:endParaRPr lang="en-NL" dirty="0"/>
+              </a:p>
+            </p:txBody>
+          </p:sp>
+          <p:sp>
+            <p:nvSpPr>
+              <p:cNvPr id="24" name="Rectangle 23">
+                <a:extLst>
+                  <a:ext uri="{FF2B5EF4-FFF2-40B4-BE49-F238E27FC236}">
+                    <a16:creationId xmlns:a16="http://schemas.microsoft.com/office/drawing/2014/main" id="{BC02299E-8A73-C326-0B55-121B2775C5CA}"/>
+                  </a:ext>
+                </a:extLst>
+              </p:cNvPr>
+              <p:cNvSpPr/>
+              <p:nvPr/>
+            </p:nvSpPr>
+            <p:spPr>
+              <a:xfrm>
+                <a:off x="7304770" y="2311032"/>
+                <a:ext cx="660400" cy="944652"/>
+              </a:xfrm>
+              <a:prstGeom prst="rect">
+                <a:avLst/>
+              </a:prstGeom>
+              <a:solidFill>
+                <a:schemeClr val="tx1">
+                  <a:lumMod val="85000"/>
+                  <a:lumOff val="15000"/>
+                  <a:alpha val="99000"/>
                 </a:schemeClr>
-              </a:extrusionClr>
-              <a:contourClr>
-                <a:schemeClr val="tx1"/>
-              </a:contourClr>
-            </a:sp3d>
-          </p:spPr>
-          <p:style>
-            <a:lnRef idx="2">
-              <a:schemeClr val="accent1">
-                <a:shade val="15000"/>
-              </a:schemeClr>
-            </a:lnRef>
-            <a:fillRef idx="1">
-              <a:schemeClr val="accent1"/>
-            </a:fillRef>
-            <a:effectRef idx="0">
-              <a:schemeClr val="accent1"/>
-            </a:effectRef>
-            <a:fontRef idx="minor">
-              <a:schemeClr val="lt1"/>
-            </a:fontRef>
-          </p:style>
-          <p:txBody>
-            <a:bodyPr rtlCol="0" anchor="ctr"/>
-            <a:lstStyle/>
-            <a:p>
-              <a:pPr algn="ctr"/>
-              <a:endParaRPr lang="en-NL" dirty="0"/>
-            </a:p>
-          </p:txBody>
-        </p:sp>
-        <p:sp>
-          <p:nvSpPr>
-            <p:cNvPr id="26" name="Rectangle 25">
-              <a:extLst>
-                <a:ext uri="{FF2B5EF4-FFF2-40B4-BE49-F238E27FC236}">
-                  <a16:creationId xmlns:a16="http://schemas.microsoft.com/office/drawing/2014/main" id="{7B504336-BB34-54E2-F2A4-87B3924BB8CE}"/>
-                </a:ext>
-              </a:extLst>
-            </p:cNvPr>
-            <p:cNvSpPr/>
-            <p:nvPr/>
-          </p:nvSpPr>
-          <p:spPr>
-            <a:xfrm>
-              <a:off x="8924735" y="2311032"/>
-              <a:ext cx="660400" cy="944652"/>
-            </a:xfrm>
-            <a:prstGeom prst="rect">
-              <a:avLst/>
-            </a:prstGeom>
-            <a:solidFill>
-              <a:schemeClr val="tx1">
-                <a:lumMod val="85000"/>
-                <a:lumOff val="15000"/>
-                <a:alpha val="99000"/>
-              </a:schemeClr>
-            </a:solidFill>
-            <a:scene3d>
-              <a:camera prst="isometricRightUp"/>
-              <a:lightRig rig="threePt" dir="t"/>
-            </a:scene3d>
-            <a:sp3d extrusionH="374650" contourW="12700">
-              <a:extrusionClr>
-                <a:schemeClr val="bg2">
-                  <a:lumMod val="50000"/>
+              </a:solidFill>
+              <a:scene3d>
+                <a:camera prst="isometricRightUp"/>
+                <a:lightRig rig="threePt" dir="t"/>
+              </a:scene3d>
+              <a:sp3d extrusionH="374650" contourW="12700">
+                <a:extrusionClr>
+                  <a:schemeClr val="bg2">
+                    <a:lumMod val="50000"/>
+                  </a:schemeClr>
+                </a:extrusionClr>
+                <a:contourClr>
+                  <a:schemeClr val="tx1"/>
+                </a:contourClr>
+              </a:sp3d>
+            </p:spPr>
+            <p:style>
+              <a:lnRef idx="2">
+                <a:schemeClr val="accent1">
+                  <a:shade val="15000"/>
                 </a:schemeClr>
-              </a:extrusionClr>
-              <a:contourClr>
-                <a:schemeClr val="tx1"/>
-              </a:contourClr>
-            </a:sp3d>
-          </p:spPr>
-          <p:style>
-            <a:lnRef idx="2">
-              <a:schemeClr val="accent1">
-                <a:shade val="15000"/>
-              </a:schemeClr>
-            </a:lnRef>
-            <a:fillRef idx="1">
-              <a:schemeClr val="accent1"/>
-            </a:fillRef>
-            <a:effectRef idx="0">
-              <a:schemeClr val="accent1"/>
-            </a:effectRef>
-            <a:fontRef idx="minor">
-              <a:schemeClr val="lt1"/>
-            </a:fontRef>
-          </p:style>
-          <p:txBody>
-            <a:bodyPr rtlCol="0" anchor="ctr"/>
-            <a:lstStyle/>
-            <a:p>
-              <a:pPr algn="ctr"/>
-              <a:endParaRPr lang="en-NL" dirty="0"/>
-            </a:p>
-          </p:txBody>
-        </p:sp>
-        <p:sp>
-          <p:nvSpPr>
-            <p:cNvPr id="27" name="TextBox 26">
-              <a:extLst>
-                <a:ext uri="{FF2B5EF4-FFF2-40B4-BE49-F238E27FC236}">
-                  <a16:creationId xmlns:a16="http://schemas.microsoft.com/office/drawing/2014/main" id="{16E3D200-8372-042D-B859-43FA2BC6497D}"/>
-                </a:ext>
-              </a:extLst>
-            </p:cNvPr>
-            <p:cNvSpPr txBox="1"/>
-            <p:nvPr/>
-          </p:nvSpPr>
-          <p:spPr>
-            <a:xfrm>
-              <a:off x="7144446" y="1725341"/>
-              <a:ext cx="1991630" cy="338554"/>
-            </a:xfrm>
-            <a:prstGeom prst="rect">
-              <a:avLst/>
-            </a:prstGeom>
-            <a:noFill/>
-          </p:spPr>
-          <p:txBody>
-            <a:bodyPr wrap="square" rtlCol="0">
-              <a:spAutoFit/>
-            </a:bodyPr>
-            <a:lstStyle/>
-            <a:p>
-              <a:pPr algn="ctr"/>
-              <a:r>
-                <a:rPr lang="en-GB" sz="1600" b="1" dirty="0"/>
-                <a:t>Compute Nodes</a:t>
-              </a:r>
-              <a:endParaRPr lang="en-NL" sz="1600" b="1" dirty="0"/>
-            </a:p>
-          </p:txBody>
-        </p:sp>
-        <p:sp>
-          <p:nvSpPr>
-            <p:cNvPr id="28" name="TextBox 27">
-              <a:extLst>
-                <a:ext uri="{FF2B5EF4-FFF2-40B4-BE49-F238E27FC236}">
-                  <a16:creationId xmlns:a16="http://schemas.microsoft.com/office/drawing/2014/main" id="{EBBD8785-5030-EAA9-C4FD-4F7EA3015261}"/>
-                </a:ext>
-              </a:extLst>
-            </p:cNvPr>
-            <p:cNvSpPr txBox="1"/>
-            <p:nvPr/>
-          </p:nvSpPr>
-          <p:spPr>
-            <a:xfrm>
-              <a:off x="5132206" y="2506359"/>
-              <a:ext cx="1249188" cy="276999"/>
-            </a:xfrm>
-            <a:prstGeom prst="rect">
-              <a:avLst/>
-            </a:prstGeom>
-            <a:noFill/>
-          </p:spPr>
-          <p:txBody>
-            <a:bodyPr wrap="none" rtlCol="0">
-              <a:spAutoFit/>
-            </a:bodyPr>
-            <a:lstStyle/>
-            <a:p>
-              <a:r>
-                <a:rPr lang="en-GB" sz="1200" b="1" dirty="0"/>
-                <a:t>Submit to queue</a:t>
-              </a:r>
-              <a:endParaRPr lang="en-NL" sz="1200" b="1" dirty="0"/>
-            </a:p>
-          </p:txBody>
-        </p:sp>
-        <p:sp>
-          <p:nvSpPr>
-            <p:cNvPr id="29" name="TextBox 28">
-              <a:extLst>
-                <a:ext uri="{FF2B5EF4-FFF2-40B4-BE49-F238E27FC236}">
-                  <a16:creationId xmlns:a16="http://schemas.microsoft.com/office/drawing/2014/main" id="{A0D85CE1-8BAE-63CC-34F5-1865B6BE4978}"/>
-                </a:ext>
-              </a:extLst>
-            </p:cNvPr>
-            <p:cNvSpPr txBox="1"/>
-            <p:nvPr/>
-          </p:nvSpPr>
-          <p:spPr>
-            <a:xfrm>
-              <a:off x="7092345" y="3311341"/>
-              <a:ext cx="2232396" cy="276999"/>
-            </a:xfrm>
-            <a:prstGeom prst="rect">
-              <a:avLst/>
-            </a:prstGeom>
-            <a:noFill/>
-          </p:spPr>
-          <p:txBody>
-            <a:bodyPr wrap="square">
-              <a:spAutoFit/>
-            </a:bodyPr>
-            <a:lstStyle/>
-            <a:p>
-              <a:r>
-                <a:rPr lang="en-GB" sz="1200" i="1" dirty="0"/>
-                <a:t>omics-h01-h05.science.uva.nl</a:t>
-              </a:r>
-              <a:endParaRPr lang="en-NL" sz="1200" dirty="0"/>
-            </a:p>
-          </p:txBody>
-        </p:sp>
-        <p:sp>
-          <p:nvSpPr>
-            <p:cNvPr id="31" name="TextBox 30">
-              <a:extLst>
-                <a:ext uri="{FF2B5EF4-FFF2-40B4-BE49-F238E27FC236}">
-                  <a16:creationId xmlns:a16="http://schemas.microsoft.com/office/drawing/2014/main" id="{5D6A5E34-FFD7-3F02-3480-5FC1FE1B5532}"/>
-                </a:ext>
-              </a:extLst>
-            </p:cNvPr>
-            <p:cNvSpPr txBox="1"/>
-            <p:nvPr/>
-          </p:nvSpPr>
-          <p:spPr>
-            <a:xfrm>
-              <a:off x="309479" y="3713088"/>
-              <a:ext cx="9284458" cy="954107"/>
-            </a:xfrm>
-            <a:prstGeom prst="rect">
-              <a:avLst/>
-            </a:prstGeom>
-            <a:noFill/>
-          </p:spPr>
-          <p:txBody>
-            <a:bodyPr wrap="square">
-              <a:spAutoFit/>
-            </a:bodyPr>
-            <a:lstStyle/>
-            <a:p>
-              <a:r>
-                <a:rPr lang="en-GB" sz="1400" dirty="0"/>
-                <a:t>Resources:</a:t>
-              </a:r>
-            </a:p>
-            <a:p>
-              <a:pPr marL="285750" indent="-285750">
-                <a:buFont typeface="Arial" panose="020B0604020202020204" pitchFamily="34" charset="0"/>
-                <a:buChar char="•"/>
-              </a:pPr>
-              <a:r>
-                <a:rPr lang="en-GB" sz="1400" dirty="0"/>
-                <a:t>Memory on head node and compute nodes: 512 GB</a:t>
-              </a:r>
-            </a:p>
-            <a:p>
-              <a:pPr marL="285750" indent="-285750">
-                <a:buFont typeface="Arial" panose="020B0604020202020204" pitchFamily="34" charset="0"/>
-                <a:buChar char="•"/>
-              </a:pPr>
-              <a:r>
-                <a:rPr lang="en-GB" sz="1400" dirty="0"/>
-                <a:t>Storage: all users have a fast 25 GB SSD home directory and a 500 GB home directory</a:t>
-              </a:r>
-            </a:p>
-            <a:p>
-              <a:endParaRPr lang="en-NL" sz="1400" dirty="0"/>
-            </a:p>
-          </p:txBody>
-        </p:sp>
-        <p:sp>
-          <p:nvSpPr>
-            <p:cNvPr id="32" name="TextBox 31">
-              <a:extLst>
-                <a:ext uri="{FF2B5EF4-FFF2-40B4-BE49-F238E27FC236}">
-                  <a16:creationId xmlns:a16="http://schemas.microsoft.com/office/drawing/2014/main" id="{A75D128E-447D-6359-5040-30977EDA7A1B}"/>
-                </a:ext>
-              </a:extLst>
-            </p:cNvPr>
-            <p:cNvSpPr txBox="1"/>
-            <p:nvPr/>
-          </p:nvSpPr>
-          <p:spPr>
-            <a:xfrm>
-              <a:off x="5172846" y="2739897"/>
-              <a:ext cx="1070486" cy="307777"/>
-            </a:xfrm>
-            <a:prstGeom prst="rect">
-              <a:avLst/>
-            </a:prstGeom>
-            <a:noFill/>
-          </p:spPr>
-          <p:txBody>
-            <a:bodyPr wrap="none" rtlCol="0">
-              <a:spAutoFit/>
-            </a:bodyPr>
-            <a:lstStyle/>
-            <a:p>
-              <a:r>
-                <a:rPr lang="en-GB" sz="1400" dirty="0" err="1"/>
-                <a:t>sbatch</a:t>
-              </a:r>
-              <a:r>
-                <a:rPr lang="en-GB" sz="1400" dirty="0"/>
-                <a:t>, </a:t>
-              </a:r>
-              <a:r>
-                <a:rPr lang="en-GB" sz="1400" dirty="0" err="1"/>
-                <a:t>srun</a:t>
-              </a:r>
-              <a:endParaRPr lang="en-NL" sz="1400" dirty="0"/>
-            </a:p>
-          </p:txBody>
-        </p:sp>
-        <p:sp>
-          <p:nvSpPr>
-            <p:cNvPr id="33" name="TextBox 32">
-              <a:extLst>
-                <a:ext uri="{FF2B5EF4-FFF2-40B4-BE49-F238E27FC236}">
-                  <a16:creationId xmlns:a16="http://schemas.microsoft.com/office/drawing/2014/main" id="{22FE1822-F26C-2B82-6020-978A3A5511B2}"/>
-                </a:ext>
-              </a:extLst>
-            </p:cNvPr>
-            <p:cNvSpPr txBox="1"/>
-            <p:nvPr/>
-          </p:nvSpPr>
-          <p:spPr>
-            <a:xfrm>
-              <a:off x="1435904" y="1602231"/>
-              <a:ext cx="579005" cy="584775"/>
-            </a:xfrm>
-            <a:prstGeom prst="rect">
-              <a:avLst/>
-            </a:prstGeom>
-            <a:noFill/>
-          </p:spPr>
-          <p:txBody>
-            <a:bodyPr wrap="none" rtlCol="0">
-              <a:spAutoFit/>
-            </a:bodyPr>
-            <a:lstStyle/>
-            <a:p>
-              <a:pPr algn="ctr"/>
-              <a:r>
-                <a:rPr lang="en-GB" sz="1600" b="1" dirty="0"/>
-                <a:t>User</a:t>
-              </a:r>
-            </a:p>
-            <a:p>
-              <a:pPr algn="ctr"/>
-              <a:r>
-                <a:rPr lang="en-GB" sz="1600" b="1" dirty="0"/>
-                <a:t> PC</a:t>
-              </a:r>
-              <a:endParaRPr lang="en-NL" sz="1600" b="1" dirty="0"/>
-            </a:p>
-          </p:txBody>
-        </p:sp>
+              </a:lnRef>
+              <a:fillRef idx="1">
+                <a:schemeClr val="accent1"/>
+              </a:fillRef>
+              <a:effectRef idx="0">
+                <a:schemeClr val="accent1"/>
+              </a:effectRef>
+              <a:fontRef idx="minor">
+                <a:schemeClr val="lt1"/>
+              </a:fontRef>
+            </p:style>
+            <p:txBody>
+              <a:bodyPr rtlCol="0" anchor="ctr"/>
+              <a:lstStyle/>
+              <a:p>
+                <a:pPr algn="ctr"/>
+                <a:endParaRPr lang="en-NL" dirty="0"/>
+              </a:p>
+            </p:txBody>
+          </p:sp>
+          <p:sp>
+            <p:nvSpPr>
+              <p:cNvPr id="23" name="Rectangle 22">
+                <a:extLst>
+                  <a:ext uri="{FF2B5EF4-FFF2-40B4-BE49-F238E27FC236}">
+                    <a16:creationId xmlns:a16="http://schemas.microsoft.com/office/drawing/2014/main" id="{D0B987B5-277C-C6A9-AF7D-6DCFD7FD7B05}"/>
+                  </a:ext>
+                </a:extLst>
+              </p:cNvPr>
+              <p:cNvSpPr/>
+              <p:nvPr/>
+            </p:nvSpPr>
+            <p:spPr>
+              <a:xfrm>
+                <a:off x="7878343" y="2311032"/>
+                <a:ext cx="660400" cy="944652"/>
+              </a:xfrm>
+              <a:prstGeom prst="rect">
+                <a:avLst/>
+              </a:prstGeom>
+              <a:solidFill>
+                <a:schemeClr val="tx1">
+                  <a:lumMod val="85000"/>
+                  <a:lumOff val="15000"/>
+                  <a:alpha val="99000"/>
+                </a:schemeClr>
+              </a:solidFill>
+              <a:scene3d>
+                <a:camera prst="isometricRightUp"/>
+                <a:lightRig rig="threePt" dir="t"/>
+              </a:scene3d>
+              <a:sp3d extrusionH="374650" contourW="12700">
+                <a:extrusionClr>
+                  <a:schemeClr val="bg2">
+                    <a:lumMod val="50000"/>
+                  </a:schemeClr>
+                </a:extrusionClr>
+                <a:contourClr>
+                  <a:schemeClr val="tx1"/>
+                </a:contourClr>
+              </a:sp3d>
+            </p:spPr>
+            <p:style>
+              <a:lnRef idx="2">
+                <a:schemeClr val="accent1">
+                  <a:shade val="15000"/>
+                </a:schemeClr>
+              </a:lnRef>
+              <a:fillRef idx="1">
+                <a:schemeClr val="accent1"/>
+              </a:fillRef>
+              <a:effectRef idx="0">
+                <a:schemeClr val="accent1"/>
+              </a:effectRef>
+              <a:fontRef idx="minor">
+                <a:schemeClr val="lt1"/>
+              </a:fontRef>
+            </p:style>
+            <p:txBody>
+              <a:bodyPr rtlCol="0" anchor="ctr"/>
+              <a:lstStyle/>
+              <a:p>
+                <a:pPr algn="ctr"/>
+                <a:endParaRPr lang="en-NL" dirty="0"/>
+              </a:p>
+            </p:txBody>
+          </p:sp>
+          <p:sp>
+            <p:nvSpPr>
+              <p:cNvPr id="25" name="Rectangle 24">
+                <a:extLst>
+                  <a:ext uri="{FF2B5EF4-FFF2-40B4-BE49-F238E27FC236}">
+                    <a16:creationId xmlns:a16="http://schemas.microsoft.com/office/drawing/2014/main" id="{B81BD75F-D1B6-57CD-FB7B-1E7E23FD105B}"/>
+                  </a:ext>
+                </a:extLst>
+              </p:cNvPr>
+              <p:cNvSpPr/>
+              <p:nvPr/>
+            </p:nvSpPr>
+            <p:spPr>
+              <a:xfrm>
+                <a:off x="8400815" y="2311032"/>
+                <a:ext cx="660400" cy="944652"/>
+              </a:xfrm>
+              <a:prstGeom prst="rect">
+                <a:avLst/>
+              </a:prstGeom>
+              <a:solidFill>
+                <a:schemeClr val="tx1">
+                  <a:lumMod val="85000"/>
+                  <a:lumOff val="15000"/>
+                  <a:alpha val="99000"/>
+                </a:schemeClr>
+              </a:solidFill>
+              <a:scene3d>
+                <a:camera prst="isometricRightUp"/>
+                <a:lightRig rig="threePt" dir="t"/>
+              </a:scene3d>
+              <a:sp3d extrusionH="374650" contourW="12700">
+                <a:extrusionClr>
+                  <a:schemeClr val="bg2">
+                    <a:lumMod val="50000"/>
+                  </a:schemeClr>
+                </a:extrusionClr>
+                <a:contourClr>
+                  <a:schemeClr val="tx1"/>
+                </a:contourClr>
+              </a:sp3d>
+            </p:spPr>
+            <p:style>
+              <a:lnRef idx="2">
+                <a:schemeClr val="accent1">
+                  <a:shade val="15000"/>
+                </a:schemeClr>
+              </a:lnRef>
+              <a:fillRef idx="1">
+                <a:schemeClr val="accent1"/>
+              </a:fillRef>
+              <a:effectRef idx="0">
+                <a:schemeClr val="accent1"/>
+              </a:effectRef>
+              <a:fontRef idx="minor">
+                <a:schemeClr val="lt1"/>
+              </a:fontRef>
+            </p:style>
+            <p:txBody>
+              <a:bodyPr rtlCol="0" anchor="ctr"/>
+              <a:lstStyle/>
+              <a:p>
+                <a:pPr algn="ctr"/>
+                <a:endParaRPr lang="en-NL" dirty="0"/>
+              </a:p>
+            </p:txBody>
+          </p:sp>
+          <p:sp>
+            <p:nvSpPr>
+              <p:cNvPr id="26" name="Rectangle 25">
+                <a:extLst>
+                  <a:ext uri="{FF2B5EF4-FFF2-40B4-BE49-F238E27FC236}">
+                    <a16:creationId xmlns:a16="http://schemas.microsoft.com/office/drawing/2014/main" id="{7B504336-BB34-54E2-F2A4-87B3924BB8CE}"/>
+                  </a:ext>
+                </a:extLst>
+              </p:cNvPr>
+              <p:cNvSpPr/>
+              <p:nvPr/>
+            </p:nvSpPr>
+            <p:spPr>
+              <a:xfrm>
+                <a:off x="8924735" y="2311032"/>
+                <a:ext cx="660400" cy="944652"/>
+              </a:xfrm>
+              <a:prstGeom prst="rect">
+                <a:avLst/>
+              </a:prstGeom>
+              <a:solidFill>
+                <a:schemeClr val="tx1">
+                  <a:lumMod val="85000"/>
+                  <a:lumOff val="15000"/>
+                  <a:alpha val="99000"/>
+                </a:schemeClr>
+              </a:solidFill>
+              <a:scene3d>
+                <a:camera prst="isometricRightUp"/>
+                <a:lightRig rig="threePt" dir="t"/>
+              </a:scene3d>
+              <a:sp3d extrusionH="374650" contourW="12700">
+                <a:extrusionClr>
+                  <a:schemeClr val="bg2">
+                    <a:lumMod val="50000"/>
+                  </a:schemeClr>
+                </a:extrusionClr>
+                <a:contourClr>
+                  <a:schemeClr val="tx1"/>
+                </a:contourClr>
+              </a:sp3d>
+            </p:spPr>
+            <p:style>
+              <a:lnRef idx="2">
+                <a:schemeClr val="accent1">
+                  <a:shade val="15000"/>
+                </a:schemeClr>
+              </a:lnRef>
+              <a:fillRef idx="1">
+                <a:schemeClr val="accent1"/>
+              </a:fillRef>
+              <a:effectRef idx="0">
+                <a:schemeClr val="accent1"/>
+              </a:effectRef>
+              <a:fontRef idx="minor">
+                <a:schemeClr val="lt1"/>
+              </a:fontRef>
+            </p:style>
+            <p:txBody>
+              <a:bodyPr rtlCol="0" anchor="ctr"/>
+              <a:lstStyle/>
+              <a:p>
+                <a:pPr algn="ctr"/>
+                <a:endParaRPr lang="en-NL" dirty="0"/>
+              </a:p>
+            </p:txBody>
+          </p:sp>
+          <p:sp>
+            <p:nvSpPr>
+              <p:cNvPr id="27" name="TextBox 26">
+                <a:extLst>
+                  <a:ext uri="{FF2B5EF4-FFF2-40B4-BE49-F238E27FC236}">
+                    <a16:creationId xmlns:a16="http://schemas.microsoft.com/office/drawing/2014/main" id="{16E3D200-8372-042D-B859-43FA2BC6497D}"/>
+                  </a:ext>
+                </a:extLst>
+              </p:cNvPr>
+              <p:cNvSpPr txBox="1"/>
+              <p:nvPr/>
+            </p:nvSpPr>
+            <p:spPr>
+              <a:xfrm>
+                <a:off x="7144446" y="1725341"/>
+                <a:ext cx="1991630" cy="338554"/>
+              </a:xfrm>
+              <a:prstGeom prst="rect">
+                <a:avLst/>
+              </a:prstGeom>
+              <a:noFill/>
+            </p:spPr>
+            <p:txBody>
+              <a:bodyPr wrap="square" rtlCol="0">
+                <a:spAutoFit/>
+              </a:bodyPr>
+              <a:lstStyle/>
+              <a:p>
+                <a:pPr algn="ctr"/>
+                <a:r>
+                  <a:rPr lang="en-GB" sz="1600" b="1" dirty="0"/>
+                  <a:t>Compute Nodes</a:t>
+                </a:r>
+                <a:endParaRPr lang="en-NL" sz="1600" b="1" dirty="0"/>
+              </a:p>
+            </p:txBody>
+          </p:sp>
+          <p:sp>
+            <p:nvSpPr>
+              <p:cNvPr id="28" name="TextBox 27">
+                <a:extLst>
+                  <a:ext uri="{FF2B5EF4-FFF2-40B4-BE49-F238E27FC236}">
+                    <a16:creationId xmlns:a16="http://schemas.microsoft.com/office/drawing/2014/main" id="{EBBD8785-5030-EAA9-C4FD-4F7EA3015261}"/>
+                  </a:ext>
+                </a:extLst>
+              </p:cNvPr>
+              <p:cNvSpPr txBox="1"/>
+              <p:nvPr/>
+            </p:nvSpPr>
+            <p:spPr>
+              <a:xfrm>
+                <a:off x="5132206" y="2506359"/>
+                <a:ext cx="1249188" cy="276999"/>
+              </a:xfrm>
+              <a:prstGeom prst="rect">
+                <a:avLst/>
+              </a:prstGeom>
+              <a:noFill/>
+            </p:spPr>
+            <p:txBody>
+              <a:bodyPr wrap="none" rtlCol="0">
+                <a:spAutoFit/>
+              </a:bodyPr>
+              <a:lstStyle/>
+              <a:p>
+                <a:r>
+                  <a:rPr lang="en-GB" sz="1200" b="1" dirty="0"/>
+                  <a:t>Submit to queue</a:t>
+                </a:r>
+                <a:endParaRPr lang="en-NL" sz="1200" b="1" dirty="0"/>
+              </a:p>
+            </p:txBody>
+          </p:sp>
+          <p:sp>
+            <p:nvSpPr>
+              <p:cNvPr id="29" name="TextBox 28">
+                <a:extLst>
+                  <a:ext uri="{FF2B5EF4-FFF2-40B4-BE49-F238E27FC236}">
+                    <a16:creationId xmlns:a16="http://schemas.microsoft.com/office/drawing/2014/main" id="{A0D85CE1-8BAE-63CC-34F5-1865B6BE4978}"/>
+                  </a:ext>
+                </a:extLst>
+              </p:cNvPr>
+              <p:cNvSpPr txBox="1"/>
+              <p:nvPr/>
+            </p:nvSpPr>
+            <p:spPr>
+              <a:xfrm>
+                <a:off x="7092345" y="3311341"/>
+                <a:ext cx="2232396" cy="276999"/>
+              </a:xfrm>
+              <a:prstGeom prst="rect">
+                <a:avLst/>
+              </a:prstGeom>
+              <a:noFill/>
+            </p:spPr>
+            <p:txBody>
+              <a:bodyPr wrap="square">
+                <a:spAutoFit/>
+              </a:bodyPr>
+              <a:lstStyle/>
+              <a:p>
+                <a:r>
+                  <a:rPr lang="en-GB" sz="1200" i="1" dirty="0"/>
+                  <a:t>omics-h01-h05.science.uva.nl</a:t>
+                </a:r>
+                <a:endParaRPr lang="en-NL" sz="1200" dirty="0"/>
+              </a:p>
+            </p:txBody>
+          </p:sp>
+          <p:sp>
+            <p:nvSpPr>
+              <p:cNvPr id="31" name="TextBox 30">
+                <a:extLst>
+                  <a:ext uri="{FF2B5EF4-FFF2-40B4-BE49-F238E27FC236}">
+                    <a16:creationId xmlns:a16="http://schemas.microsoft.com/office/drawing/2014/main" id="{5D6A5E34-FFD7-3F02-3480-5FC1FE1B5532}"/>
+                  </a:ext>
+                </a:extLst>
+              </p:cNvPr>
+              <p:cNvSpPr txBox="1"/>
+              <p:nvPr/>
+            </p:nvSpPr>
+            <p:spPr>
+              <a:xfrm>
+                <a:off x="309479" y="3713088"/>
+                <a:ext cx="9284458" cy="954107"/>
+              </a:xfrm>
+              <a:prstGeom prst="rect">
+                <a:avLst/>
+              </a:prstGeom>
+              <a:noFill/>
+            </p:spPr>
+            <p:txBody>
+              <a:bodyPr wrap="square">
+                <a:spAutoFit/>
+              </a:bodyPr>
+              <a:lstStyle/>
+              <a:p>
+                <a:r>
+                  <a:rPr lang="en-GB" sz="1400" dirty="0"/>
+                  <a:t>Resources:</a:t>
+                </a:r>
+              </a:p>
+              <a:p>
+                <a:pPr marL="285750" indent="-285750">
+                  <a:buFont typeface="Arial" panose="020B0604020202020204" pitchFamily="34" charset="0"/>
+                  <a:buChar char="•"/>
+                </a:pPr>
+                <a:r>
+                  <a:rPr lang="en-GB" sz="1400" dirty="0"/>
+                  <a:t>Memory on head node and compute nodes: 512 GB</a:t>
+                </a:r>
+              </a:p>
+              <a:p>
+                <a:pPr marL="285750" indent="-285750">
+                  <a:buFont typeface="Arial" panose="020B0604020202020204" pitchFamily="34" charset="0"/>
+                  <a:buChar char="•"/>
+                </a:pPr>
+                <a:r>
+                  <a:rPr lang="en-GB" sz="1400" dirty="0"/>
+                  <a:t>Storage: all users have a fast 25 GB SSD home directory and a 500 GB home directory</a:t>
+                </a:r>
+              </a:p>
+              <a:p>
+                <a:endParaRPr lang="en-NL" sz="1400" dirty="0"/>
+              </a:p>
+            </p:txBody>
+          </p:sp>
+          <p:sp>
+            <p:nvSpPr>
+              <p:cNvPr id="32" name="TextBox 31">
+                <a:extLst>
+                  <a:ext uri="{FF2B5EF4-FFF2-40B4-BE49-F238E27FC236}">
+                    <a16:creationId xmlns:a16="http://schemas.microsoft.com/office/drawing/2014/main" id="{A75D128E-447D-6359-5040-30977EDA7A1B}"/>
+                  </a:ext>
+                </a:extLst>
+              </p:cNvPr>
+              <p:cNvSpPr txBox="1"/>
+              <p:nvPr/>
+            </p:nvSpPr>
+            <p:spPr>
+              <a:xfrm>
+                <a:off x="5172846" y="2739897"/>
+                <a:ext cx="1070486" cy="307777"/>
+              </a:xfrm>
+              <a:prstGeom prst="rect">
+                <a:avLst/>
+              </a:prstGeom>
+              <a:noFill/>
+            </p:spPr>
+            <p:txBody>
+              <a:bodyPr wrap="none" rtlCol="0">
+                <a:spAutoFit/>
+              </a:bodyPr>
+              <a:lstStyle/>
+              <a:p>
+                <a:r>
+                  <a:rPr lang="en-GB" sz="1400" dirty="0" err="1"/>
+                  <a:t>sbatch</a:t>
+                </a:r>
+                <a:r>
+                  <a:rPr lang="en-GB" sz="1400" dirty="0"/>
+                  <a:t>, </a:t>
+                </a:r>
+                <a:r>
+                  <a:rPr lang="en-GB" sz="1400" dirty="0" err="1"/>
+                  <a:t>srun</a:t>
+                </a:r>
+                <a:endParaRPr lang="en-NL" sz="1400" dirty="0"/>
+              </a:p>
+            </p:txBody>
+          </p:sp>
+          <p:sp>
+            <p:nvSpPr>
+              <p:cNvPr id="33" name="TextBox 32">
+                <a:extLst>
+                  <a:ext uri="{FF2B5EF4-FFF2-40B4-BE49-F238E27FC236}">
+                    <a16:creationId xmlns:a16="http://schemas.microsoft.com/office/drawing/2014/main" id="{22FE1822-F26C-2B82-6020-978A3A5511B2}"/>
+                  </a:ext>
+                </a:extLst>
+              </p:cNvPr>
+              <p:cNvSpPr txBox="1"/>
+              <p:nvPr/>
+            </p:nvSpPr>
+            <p:spPr>
+              <a:xfrm>
+                <a:off x="1435904" y="1602231"/>
+                <a:ext cx="579005" cy="584775"/>
+              </a:xfrm>
+              <a:prstGeom prst="rect">
+                <a:avLst/>
+              </a:prstGeom>
+              <a:noFill/>
+            </p:spPr>
+            <p:txBody>
+              <a:bodyPr wrap="none" rtlCol="0">
+                <a:spAutoFit/>
+              </a:bodyPr>
+              <a:lstStyle/>
+              <a:p>
+                <a:pPr algn="ctr"/>
+                <a:r>
+                  <a:rPr lang="en-GB" sz="1600" b="1" dirty="0"/>
+                  <a:t>User</a:t>
+                </a:r>
+              </a:p>
+              <a:p>
+                <a:pPr algn="ctr"/>
+                <a:r>
+                  <a:rPr lang="en-GB" sz="1600" b="1" dirty="0"/>
+                  <a:t> PC</a:t>
+                </a:r>
+                <a:endParaRPr lang="en-NL" sz="1600" b="1" dirty="0"/>
+              </a:p>
+            </p:txBody>
+          </p:sp>
+        </p:grpSp>
       </p:grpSp>
     </p:spTree>
     <p:extLst>
@@ -4410,6 +4484,66 @@
     <p:extLst>
       <p:ext uri="{BB962C8B-B14F-4D97-AF65-F5344CB8AC3E}">
         <p14:creationId xmlns:p14="http://schemas.microsoft.com/office/powerpoint/2010/main" val="3287705445"/>
+      </p:ext>
+    </p:extLst>
+  </p:cSld>
+  <p:clrMapOvr>
+    <a:masterClrMapping/>
+  </p:clrMapOvr>
+</p:sld>
+</file>
+
+<file path=ppt/slides/slide3.xml><?xml version="1.0" encoding="utf-8"?>
+<p:sld xmlns:a="http://schemas.openxmlformats.org/drawingml/2006/main" xmlns:r="http://schemas.openxmlformats.org/officeDocument/2006/relationships" xmlns:p="http://schemas.openxmlformats.org/presentationml/2006/main">
+  <p:cSld>
+    <p:spTree>
+      <p:nvGrpSpPr>
+        <p:cNvPr id="1" name=""/>
+        <p:cNvGrpSpPr/>
+        <p:nvPr/>
+      </p:nvGrpSpPr>
+      <p:grpSpPr>
+        <a:xfrm>
+          <a:off x="0" y="0"/>
+          <a:ext cx="0" cy="0"/>
+          <a:chOff x="0" y="0"/>
+          <a:chExt cx="0" cy="0"/>
+        </a:xfrm>
+      </p:grpSpPr>
+      <p:pic>
+        <p:nvPicPr>
+          <p:cNvPr id="10" name="Picture 9">
+            <a:extLst>
+              <a:ext uri="{FF2B5EF4-FFF2-40B4-BE49-F238E27FC236}">
+                <a16:creationId xmlns:a16="http://schemas.microsoft.com/office/drawing/2014/main" id="{1593988D-679F-6359-58A9-8CB2B6B1411E}"/>
+              </a:ext>
+            </a:extLst>
+          </p:cNvPr>
+          <p:cNvPicPr>
+            <a:picLocks noChangeAspect="1"/>
+          </p:cNvPicPr>
+          <p:nvPr/>
+        </p:nvPicPr>
+        <p:blipFill>
+          <a:blip r:embed="rId2"/>
+          <a:stretch>
+            <a:fillRect/>
+          </a:stretch>
+        </p:blipFill>
+        <p:spPr>
+          <a:xfrm>
+            <a:off x="3792085" y="1744824"/>
+            <a:ext cx="3463592" cy="2531907"/>
+          </a:xfrm>
+          <a:prstGeom prst="rect">
+            <a:avLst/>
+          </a:prstGeom>
+        </p:spPr>
+      </p:pic>
+    </p:spTree>
+    <p:extLst>
+      <p:ext uri="{BB962C8B-B14F-4D97-AF65-F5344CB8AC3E}">
+        <p14:creationId xmlns:p14="http://schemas.microsoft.com/office/powerpoint/2010/main" val="3254529149"/>
       </p:ext>
     </p:extLst>
   </p:cSld>

</xml_diff>